<commit_message>
Fehlerbehebung in der Paesentation
</commit_message>
<xml_diff>
--- a/Praesentation.pptx
+++ b/Praesentation.pptx
@@ -3314,13 +3314,13 @@
   <p:clrMapOvr>
     <a:masterClrMapping/>
   </p:clrMapOvr>
-  <mc:AlternateContent xmlns:mc="http://schemas.openxmlformats.org/markup-compatibility/2006">
-    <mc:Choice xmlns:p14="http://schemas.microsoft.com/office/powerpoint/2010/main" Requires="p14">
+  <mc:AlternateContent xmlns:mc="http://schemas.openxmlformats.org/markup-compatibility/2006" xmlns:p14="http://schemas.microsoft.com/office/powerpoint/2010/main">
+    <mc:Choice Requires="p14">
       <p:transition spd="med" p14:dur="700">
         <p:fade/>
       </p:transition>
     </mc:Choice>
-    <mc:Fallback>
+    <mc:Fallback xmlns="">
       <p:transition spd="med">
         <p:fade/>
       </p:transition>
@@ -3625,15 +3625,31 @@
                   <a:schemeClr val="bg1"/>
                 </a:solidFill>
               </a:rPr>
-              <a:t>Wir wollten eine Projektidee zum Thema Gesundheit finden und sind dann auf die Idee gekommen die Menschen über die aktuellen </a:t>
-            </a:r>
-            <a:r>
-              <a:rPr lang="de-DE" dirty="0" smtClean="0">
+              <a:t>Wir wollten eine Projektidee zum Thema Gesundheit finden und sind dann auf die Idee gekommen die Menschen über die aktuellen Daten der Umgebung </a:t>
+            </a:r>
+            <a:r>
+              <a:rPr lang="de-DE" smtClean="0">
                 <a:solidFill>
                   <a:schemeClr val="bg1"/>
                 </a:solidFill>
               </a:rPr>
-              <a:t>Daten der Umgebung zu geben.</a:t>
+              <a:t>zu </a:t>
+            </a:r>
+            <a:r>
+              <a:rPr lang="de-DE" smtClean="0">
+                <a:solidFill>
+                  <a:schemeClr val="bg1"/>
+                </a:solidFill>
+              </a:rPr>
+              <a:t>informieren</a:t>
+            </a:r>
+            <a:r>
+              <a:rPr lang="de-DE" smtClean="0">
+                <a:solidFill>
+                  <a:schemeClr val="bg1"/>
+                </a:solidFill>
+              </a:rPr>
+              <a:t>.</a:t>
             </a:r>
             <a:endParaRPr lang="de-DE" dirty="0" smtClean="0">
               <a:solidFill>
@@ -3653,13 +3669,13 @@
   <p:clrMapOvr>
     <a:masterClrMapping/>
   </p:clrMapOvr>
-  <mc:AlternateContent xmlns:mc="http://schemas.openxmlformats.org/markup-compatibility/2006">
-    <mc:Choice xmlns:p14="http://schemas.microsoft.com/office/powerpoint/2010/main" Requires="p14">
+  <mc:AlternateContent xmlns:mc="http://schemas.openxmlformats.org/markup-compatibility/2006" xmlns:p14="http://schemas.microsoft.com/office/powerpoint/2010/main">
+    <mc:Choice Requires="p14">
       <p:transition spd="med" p14:dur="700">
         <p:fade/>
       </p:transition>
     </mc:Choice>
-    <mc:Fallback>
+    <mc:Fallback xmlns="">
       <p:transition spd="med">
         <p:fade/>
       </p:transition>
@@ -3814,13 +3830,13 @@
   <p:clrMapOvr>
     <a:masterClrMapping/>
   </p:clrMapOvr>
-  <mc:AlternateContent xmlns:mc="http://schemas.openxmlformats.org/markup-compatibility/2006">
-    <mc:Choice xmlns:p14="http://schemas.microsoft.com/office/powerpoint/2010/main" Requires="p14">
+  <mc:AlternateContent xmlns:mc="http://schemas.openxmlformats.org/markup-compatibility/2006" xmlns:p14="http://schemas.microsoft.com/office/powerpoint/2010/main">
+    <mc:Choice Requires="p14">
       <p:transition spd="slow" p14:dur="3400">
         <p14:reveal/>
       </p:transition>
     </mc:Choice>
-    <mc:Fallback>
+    <mc:Fallback xmlns="">
       <p:transition spd="slow">
         <p:fade/>
       </p:transition>
@@ -4035,13 +4051,13 @@
   <p:clrMapOvr>
     <a:masterClrMapping/>
   </p:clrMapOvr>
-  <mc:AlternateContent xmlns:mc="http://schemas.openxmlformats.org/markup-compatibility/2006">
-    <mc:Choice xmlns:p14="http://schemas.microsoft.com/office/powerpoint/2010/main" Requires="p14">
+  <mc:AlternateContent xmlns:mc="http://schemas.openxmlformats.org/markup-compatibility/2006" xmlns:p14="http://schemas.microsoft.com/office/powerpoint/2010/main">
+    <mc:Choice Requires="p14">
       <p:transition spd="slow" p14:dur="1500">
         <p:split orient="vert"/>
       </p:transition>
     </mc:Choice>
-    <mc:Fallback>
+    <mc:Fallback xmlns="">
       <p:transition spd="slow">
         <p:split orient="vert"/>
       </p:transition>

</xml_diff>